<commit_message>
je charge un fichier word
</commit_message>
<xml_diff>
--- a/Présentation1.pptx
+++ b/Présentation1.pptx
@@ -5,7 +5,7 @@
     <p:sldMasterId id="2147483648" r:id="rId1"/>
   </p:sldMasterIdLst>
   <p:handoutMasterIdLst>
-    <p:handoutMasterId r:id="rId13"/>
+    <p:handoutMasterId r:id="rId14"/>
   </p:handoutMasterIdLst>
   <p:sldIdLst>
     <p:sldId id="256" r:id="rId2"/>
@@ -19,6 +19,7 @@
     <p:sldId id="263" r:id="rId10"/>
     <p:sldId id="266" r:id="rId11"/>
     <p:sldId id="265" r:id="rId12"/>
+    <p:sldId id="268" r:id="rId13"/>
   </p:sldIdLst>
   <p:sldSz cx="12192000" cy="6858000"/>
   <p:notesSz cx="6858000" cy="9144000"/>
@@ -3679,7 +3680,7 @@
           <a:p>
             <a:fld id="{B09BAF60-FDC7-4786-B9FC-E880314432CC}" type="datetimeFigureOut">
               <a:rPr lang="en-GB" smtClean="0"/>
-              <a:t>13/12/2020</a:t>
+              <a:t>14/12/2020</a:t>
             </a:fld>
             <a:endParaRPr lang="en-GB"/>
           </a:p>
@@ -3923,7 +3924,7 @@
           <a:p>
             <a:fld id="{4503E47A-3273-4438-80C4-4A05C8C7201C}" type="datetimeFigureOut">
               <a:rPr lang="en-GB" smtClean="0"/>
-              <a:t>13/12/2020</a:t>
+              <a:t>14/12/2020</a:t>
             </a:fld>
             <a:endParaRPr lang="en-GB"/>
           </a:p>
@@ -4123,7 +4124,7 @@
           <a:p>
             <a:fld id="{4503E47A-3273-4438-80C4-4A05C8C7201C}" type="datetimeFigureOut">
               <a:rPr lang="en-GB" smtClean="0"/>
-              <a:t>13/12/2020</a:t>
+              <a:t>14/12/2020</a:t>
             </a:fld>
             <a:endParaRPr lang="en-GB"/>
           </a:p>
@@ -4333,7 +4334,7 @@
           <a:p>
             <a:fld id="{4503E47A-3273-4438-80C4-4A05C8C7201C}" type="datetimeFigureOut">
               <a:rPr lang="en-GB" smtClean="0"/>
-              <a:t>13/12/2020</a:t>
+              <a:t>14/12/2020</a:t>
             </a:fld>
             <a:endParaRPr lang="en-GB"/>
           </a:p>
@@ -4533,7 +4534,7 @@
           <a:p>
             <a:fld id="{4503E47A-3273-4438-80C4-4A05C8C7201C}" type="datetimeFigureOut">
               <a:rPr lang="en-GB" smtClean="0"/>
-              <a:t>13/12/2020</a:t>
+              <a:t>14/12/2020</a:t>
             </a:fld>
             <a:endParaRPr lang="en-GB"/>
           </a:p>
@@ -4809,7 +4810,7 @@
           <a:p>
             <a:fld id="{4503E47A-3273-4438-80C4-4A05C8C7201C}" type="datetimeFigureOut">
               <a:rPr lang="en-GB" smtClean="0"/>
-              <a:t>13/12/2020</a:t>
+              <a:t>14/12/2020</a:t>
             </a:fld>
             <a:endParaRPr lang="en-GB"/>
           </a:p>
@@ -5077,7 +5078,7 @@
           <a:p>
             <a:fld id="{4503E47A-3273-4438-80C4-4A05C8C7201C}" type="datetimeFigureOut">
               <a:rPr lang="en-GB" smtClean="0"/>
-              <a:t>13/12/2020</a:t>
+              <a:t>14/12/2020</a:t>
             </a:fld>
             <a:endParaRPr lang="en-GB"/>
           </a:p>
@@ -5492,7 +5493,7 @@
           <a:p>
             <a:fld id="{4503E47A-3273-4438-80C4-4A05C8C7201C}" type="datetimeFigureOut">
               <a:rPr lang="en-GB" smtClean="0"/>
-              <a:t>13/12/2020</a:t>
+              <a:t>14/12/2020</a:t>
             </a:fld>
             <a:endParaRPr lang="en-GB"/>
           </a:p>
@@ -5634,7 +5635,7 @@
           <a:p>
             <a:fld id="{4503E47A-3273-4438-80C4-4A05C8C7201C}" type="datetimeFigureOut">
               <a:rPr lang="en-GB" smtClean="0"/>
-              <a:t>13/12/2020</a:t>
+              <a:t>14/12/2020</a:t>
             </a:fld>
             <a:endParaRPr lang="en-GB"/>
           </a:p>
@@ -5747,7 +5748,7 @@
           <a:p>
             <a:fld id="{4503E47A-3273-4438-80C4-4A05C8C7201C}" type="datetimeFigureOut">
               <a:rPr lang="en-GB" smtClean="0"/>
-              <a:t>13/12/2020</a:t>
+              <a:t>14/12/2020</a:t>
             </a:fld>
             <a:endParaRPr lang="en-GB"/>
           </a:p>
@@ -6060,7 +6061,7 @@
           <a:p>
             <a:fld id="{4503E47A-3273-4438-80C4-4A05C8C7201C}" type="datetimeFigureOut">
               <a:rPr lang="en-GB" smtClean="0"/>
-              <a:t>13/12/2020</a:t>
+              <a:t>14/12/2020</a:t>
             </a:fld>
             <a:endParaRPr lang="en-GB"/>
           </a:p>
@@ -6349,7 +6350,7 @@
           <a:p>
             <a:fld id="{4503E47A-3273-4438-80C4-4A05C8C7201C}" type="datetimeFigureOut">
               <a:rPr lang="en-GB" smtClean="0"/>
-              <a:t>13/12/2020</a:t>
+              <a:t>14/12/2020</a:t>
             </a:fld>
             <a:endParaRPr lang="en-GB"/>
           </a:p>
@@ -6592,7 +6593,7 @@
           <a:p>
             <a:fld id="{4503E47A-3273-4438-80C4-4A05C8C7201C}" type="datetimeFigureOut">
               <a:rPr lang="en-GB" smtClean="0"/>
-              <a:t>13/12/2020</a:t>
+              <a:t>14/12/2020</a:t>
             </a:fld>
             <a:endParaRPr lang="en-GB"/>
           </a:p>
@@ -7588,6 +7589,84 @@
             <a:endParaRPr lang="fr-BE" dirty="0"/>
           </a:p>
           <a:p>
+            <a:pPr marL="457200" lvl="1" indent="0">
+              <a:buClr>
+                <a:srgbClr val="FF9900"/>
+              </a:buClr>
+              <a:buNone/>
+            </a:pPr>
+            <a:r>
+              <a:rPr lang="fr-BE" dirty="0" err="1"/>
+              <a:t>Idea</a:t>
+            </a:r>
+            <a:r>
+              <a:rPr lang="fr-BE" dirty="0"/>
+              <a:t> : </a:t>
+            </a:r>
+            <a:r>
+              <a:rPr lang="en-GB" dirty="0"/>
+              <a:t>Ventana GW5510 Rugged &amp; Industrial Single Board Computer?</a:t>
+            </a:r>
+          </a:p>
+          <a:p>
+            <a:pPr marL="457200" lvl="1" indent="0">
+              <a:buClr>
+                <a:srgbClr val="FF9900"/>
+              </a:buClr>
+              <a:buNone/>
+            </a:pPr>
+            <a:r>
+              <a:rPr lang="fr-BE" sz="1600" dirty="0">
+                <a:solidFill>
+                  <a:srgbClr val="00B0F0"/>
+                </a:solidFill>
+                <a:hlinkClick r:id="rId2"/>
+              </a:rPr>
+              <a:t>https://www.gateworks.com/products/industrial-single-board-computers/imx6-single-board-computer-gateworks-ventana-family/gw5510-single-board-computer/</a:t>
+            </a:r>
+            <a:endParaRPr lang="fr-BE" sz="1600" dirty="0">
+              <a:solidFill>
+                <a:srgbClr val="00B0F0"/>
+              </a:solidFill>
+            </a:endParaRPr>
+          </a:p>
+          <a:p>
+            <a:pPr marL="457200" lvl="1" indent="0">
+              <a:buClr>
+                <a:srgbClr val="FF9900"/>
+              </a:buClr>
+              <a:buNone/>
+            </a:pPr>
+            <a:r>
+              <a:rPr lang="fr-BE" sz="1600" dirty="0"/>
+              <a:t>OR </a:t>
+            </a:r>
+            <a:r>
+              <a:rPr lang="fr-BE" sz="1600" dirty="0" err="1"/>
+              <a:t>Adruino</a:t>
+            </a:r>
+            <a:r>
+              <a:rPr lang="fr-BE" sz="1600" dirty="0"/>
+              <a:t> </a:t>
+            </a:r>
+            <a:r>
+              <a:rPr lang="fr-BE" sz="1600" dirty="0" err="1"/>
+              <a:t>Mega</a:t>
+            </a:r>
+            <a:r>
+              <a:rPr lang="fr-BE" sz="1600" dirty="0"/>
+              <a:t> 2560, Arduino Nano Clone, </a:t>
+            </a:r>
+            <a:r>
+              <a:rPr lang="fr-BE" sz="1600" dirty="0" err="1"/>
+              <a:t>Teensy</a:t>
+            </a:r>
+            <a:r>
+              <a:rPr lang="fr-BE" sz="1600" dirty="0"/>
+              <a:t> 3,1</a:t>
+            </a:r>
+          </a:p>
+          <a:p>
             <a:pPr lvl="2">
               <a:buClr>
                 <a:srgbClr val="FF9900"/>
@@ -7710,7 +7789,7 @@
             <a:avLst/>
           </a:prstGeom>
           <a:solidFill>
-            <a:srgbClr val="00B0F0"/>
+            <a:srgbClr val="7030A0"/>
           </a:solidFill>
           <a:ln>
             <a:noFill/>
@@ -7796,13 +7875,13 @@
         </p:nvSpPr>
         <p:spPr>
           <a:xfrm>
-            <a:off x="838200" y="1825625"/>
+            <a:off x="838200" y="1585928"/>
             <a:ext cx="10515600" cy="2024922"/>
           </a:xfrm>
         </p:spPr>
         <p:txBody>
           <a:bodyPr>
-            <a:normAutofit fontScale="77500" lnSpcReduction="20000"/>
+            <a:normAutofit fontScale="55000" lnSpcReduction="20000"/>
           </a:bodyPr>
           <a:lstStyle/>
           <a:p>
@@ -7971,15 +8050,7 @@
             </a:r>
             <a:r>
               <a:rPr lang="fr-BE" dirty="0"/>
-              <a:t> as light as </a:t>
-            </a:r>
-            <a:r>
-              <a:rPr lang="fr-BE" dirty="0" err="1"/>
-              <a:t>poissible</a:t>
-            </a:r>
-            <a:r>
-              <a:rPr lang="fr-BE" dirty="0"/>
-              <a:t>.</a:t>
+              <a:t> as light as possible.</a:t>
             </a:r>
           </a:p>
           <a:p>
@@ -7999,6 +8070,36 @@
             <a:r>
               <a:rPr lang="fr-BE" dirty="0"/>
               <a:t> ?</a:t>
+            </a:r>
+          </a:p>
+          <a:p>
+            <a:pPr>
+              <a:buClr>
+                <a:srgbClr val="FF9900"/>
+              </a:buClr>
+            </a:pPr>
+            <a:r>
+              <a:rPr lang="fr-BE" dirty="0"/>
+              <a:t>How to design the </a:t>
+            </a:r>
+            <a:r>
+              <a:rPr lang="fr-BE" dirty="0" err="1"/>
+              <a:t>propellers</a:t>
+            </a:r>
+            <a:r>
+              <a:rPr lang="fr-BE" dirty="0"/>
+              <a:t> ?</a:t>
+            </a:r>
+          </a:p>
+          <a:p>
+            <a:pPr>
+              <a:buClr>
+                <a:srgbClr val="FF9900"/>
+              </a:buClr>
+            </a:pPr>
+            <a:r>
+              <a:rPr lang="fr-BE" dirty="0"/>
+              <a:t>X configuration : more stable</a:t>
             </a:r>
           </a:p>
           <a:p>
@@ -8069,6 +8170,294 @@
     <p:extLst>
       <p:ext uri="{BB962C8B-B14F-4D97-AF65-F5344CB8AC3E}">
         <p14:creationId xmlns:p14="http://schemas.microsoft.com/office/powerpoint/2010/main" val="2548230454"/>
+      </p:ext>
+    </p:extLst>
+  </p:cSld>
+  <p:clrMapOvr>
+    <a:masterClrMapping/>
+  </p:clrMapOvr>
+</p:sld>
+</file>
+
+<file path=ppt/slides/slide12.xml><?xml version="1.0" encoding="utf-8"?>
+<p:sld xmlns:a="http://schemas.openxmlformats.org/drawingml/2006/main" xmlns:r="http://schemas.openxmlformats.org/officeDocument/2006/relationships" xmlns:p="http://schemas.openxmlformats.org/presentationml/2006/main">
+  <p:cSld>
+    <p:spTree>
+      <p:nvGrpSpPr>
+        <p:cNvPr id="1" name=""/>
+        <p:cNvGrpSpPr/>
+        <p:nvPr/>
+      </p:nvGrpSpPr>
+      <p:grpSpPr>
+        <a:xfrm>
+          <a:off x="0" y="0"/>
+          <a:ext cx="0" cy="0"/>
+          <a:chOff x="0" y="0"/>
+          <a:chExt cx="0" cy="0"/>
+        </a:xfrm>
+      </p:grpSpPr>
+      <p:sp>
+        <p:nvSpPr>
+          <p:cNvPr id="2" name="Titre 1">
+            <a:extLst>
+              <a:ext uri="{FF2B5EF4-FFF2-40B4-BE49-F238E27FC236}">
+                <a16:creationId xmlns:a16="http://schemas.microsoft.com/office/drawing/2014/main" id="{45F774E1-0963-4777-88B1-E0474F9452D8}"/>
+              </a:ext>
+            </a:extLst>
+          </p:cNvPr>
+          <p:cNvSpPr>
+            <a:spLocks noGrp="1"/>
+          </p:cNvSpPr>
+          <p:nvPr>
+            <p:ph type="title"/>
+          </p:nvPr>
+        </p:nvSpPr>
+        <p:spPr>
+          <a:xfrm>
+            <a:off x="838200" y="-265190"/>
+            <a:ext cx="10515600" cy="1325563"/>
+          </a:xfrm>
+        </p:spPr>
+        <p:txBody>
+          <a:bodyPr/>
+          <a:lstStyle/>
+          <a:p>
+            <a:r>
+              <a:rPr lang="fr-BE" dirty="0"/>
+              <a:t>To do</a:t>
+            </a:r>
+            <a:endParaRPr lang="en-GB" dirty="0"/>
+          </a:p>
+        </p:txBody>
+      </p:sp>
+      <p:sp>
+        <p:nvSpPr>
+          <p:cNvPr id="3" name="Espace réservé du contenu 2">
+            <a:extLst>
+              <a:ext uri="{FF2B5EF4-FFF2-40B4-BE49-F238E27FC236}">
+                <a16:creationId xmlns:a16="http://schemas.microsoft.com/office/drawing/2014/main" id="{C41516D8-E0E3-435F-988A-68DFC224C988}"/>
+              </a:ext>
+            </a:extLst>
+          </p:cNvPr>
+          <p:cNvSpPr>
+            <a:spLocks noGrp="1"/>
+          </p:cNvSpPr>
+          <p:nvPr>
+            <p:ph idx="1"/>
+          </p:nvPr>
+        </p:nvSpPr>
+        <p:spPr>
+          <a:xfrm>
+            <a:off x="838200" y="778060"/>
+            <a:ext cx="10515600" cy="4351338"/>
+          </a:xfrm>
+        </p:spPr>
+        <p:txBody>
+          <a:bodyPr>
+            <a:normAutofit lnSpcReduction="10000"/>
+          </a:bodyPr>
+          <a:lstStyle/>
+          <a:p>
+            <a:r>
+              <a:rPr lang="fr-BE" sz="1800" dirty="0"/>
+              <a:t>Hélices et moteurs : faire le lien entre la vitesse des moteurs et les forces de poussée des hélices. (modèle math + simulation). -&gt; </a:t>
+            </a:r>
+            <a:r>
+              <a:rPr lang="fr-BE" sz="1800" dirty="0">
+                <a:solidFill>
+                  <a:srgbClr val="FF0000"/>
+                </a:solidFill>
+              </a:rPr>
+              <a:t>Valentin</a:t>
+            </a:r>
+          </a:p>
+          <a:p>
+            <a:r>
+              <a:rPr lang="fr-BE" sz="1800" dirty="0"/>
+              <a:t>ESC et moteurs : liens entre l’input de l’ESC et le comportement des moteurs (tension, …) -&gt; </a:t>
+            </a:r>
+            <a:r>
+              <a:rPr lang="fr-BE" sz="1800" dirty="0">
+                <a:solidFill>
+                  <a:srgbClr val="00B050"/>
+                </a:solidFill>
+              </a:rPr>
+              <a:t>Florent</a:t>
+            </a:r>
+          </a:p>
+          <a:p>
+            <a:r>
+              <a:rPr lang="fr-BE" sz="1800" dirty="0"/>
+              <a:t>Importance et impact des forces de trainées sur la puissance des moteurs. -&gt; </a:t>
+            </a:r>
+            <a:r>
+              <a:rPr lang="fr-BE" sz="1800" dirty="0">
+                <a:solidFill>
+                  <a:srgbClr val="FF0000"/>
+                </a:solidFill>
+              </a:rPr>
+              <a:t>Valentin</a:t>
+            </a:r>
+          </a:p>
+          <a:p>
+            <a:r>
+              <a:rPr lang="fr-BE" sz="1800" dirty="0"/>
+              <a:t>Power distribution </a:t>
+            </a:r>
+            <a:r>
+              <a:rPr lang="fr-BE" sz="1800" dirty="0" err="1"/>
+              <a:t>board</a:t>
+            </a:r>
+            <a:r>
+              <a:rPr lang="fr-BE" sz="1800" dirty="0"/>
+              <a:t> (quels branchement + voir ce qui se fait (prix,…)) -&gt; </a:t>
+            </a:r>
+            <a:r>
+              <a:rPr lang="fr-BE" sz="1800" dirty="0">
+                <a:solidFill>
+                  <a:srgbClr val="FFC000"/>
+                </a:solidFill>
+              </a:rPr>
+              <a:t>Adrien</a:t>
+            </a:r>
+          </a:p>
+          <a:p>
+            <a:r>
+              <a:rPr lang="fr-BE" sz="1800" dirty="0"/>
+              <a:t>Caméra : se renseigner juste sur le poids de la caméra  + quelle type d’image il faut-&gt;  &lt;720p&gt; -&gt; </a:t>
+            </a:r>
+            <a:r>
+              <a:rPr lang="fr-BE" sz="1800" dirty="0">
+                <a:solidFill>
+                  <a:srgbClr val="FFC000"/>
+                </a:solidFill>
+              </a:rPr>
+              <a:t>Adrien</a:t>
+            </a:r>
+          </a:p>
+          <a:p>
+            <a:r>
+              <a:rPr lang="fr-BE" sz="1800" dirty="0"/>
+              <a:t>Accéléromètre : regarder ce qui est disponible, faut il filtrer ou non ? Quelle résolution ? Comment obtenir l’angle en fonction des données de l’accéléromètre. Gyroscope : pareil ^^ -&gt; </a:t>
+            </a:r>
+            <a:r>
+              <a:rPr lang="fr-BE" sz="1800" dirty="0">
+                <a:solidFill>
+                  <a:srgbClr val="00B050"/>
+                </a:solidFill>
+              </a:rPr>
+              <a:t>Florent</a:t>
+            </a:r>
+          </a:p>
+          <a:p>
+            <a:r>
+              <a:rPr lang="fr-BE" sz="1800" dirty="0"/>
+              <a:t>Flight Controller : trouver une </a:t>
+            </a:r>
+            <a:r>
+              <a:rPr lang="fr-BE" sz="1800" dirty="0" err="1"/>
+              <a:t>board</a:t>
+            </a:r>
+            <a:r>
+              <a:rPr lang="fr-BE" sz="1800" dirty="0"/>
+              <a:t> qui puisse faire ce dont on a besoin sans avoir trop d’élément avec. -&gt; </a:t>
+            </a:r>
+            <a:r>
+              <a:rPr lang="fr-BE" sz="1800" dirty="0">
+                <a:solidFill>
+                  <a:srgbClr val="FFC000"/>
+                </a:solidFill>
+              </a:rPr>
+              <a:t>Adrien</a:t>
+            </a:r>
+          </a:p>
+          <a:p>
+            <a:r>
+              <a:rPr lang="fr-BE" sz="1800" dirty="0"/>
+              <a:t>Communication : via wifi (clé wifi) : contrôle du flight </a:t>
+            </a:r>
+            <a:r>
+              <a:rPr lang="fr-BE" sz="1800" dirty="0" err="1"/>
+              <a:t>controler</a:t>
+            </a:r>
+            <a:r>
+              <a:rPr lang="fr-BE" sz="1800" dirty="0"/>
+              <a:t> + </a:t>
+            </a:r>
+            <a:r>
+              <a:rPr lang="fr-BE" sz="1800" dirty="0" err="1"/>
+              <a:t>stream</a:t>
+            </a:r>
+            <a:r>
+              <a:rPr lang="fr-BE" sz="1800" dirty="0"/>
+              <a:t> </a:t>
+            </a:r>
+            <a:r>
+              <a:rPr lang="fr-BE" sz="1800" dirty="0" err="1"/>
+              <a:t>video</a:t>
+            </a:r>
+            <a:r>
+              <a:rPr lang="fr-BE" sz="1800" dirty="0"/>
+              <a:t>. Quel matos est nécessaire ? Flux possible ? -&gt; </a:t>
+            </a:r>
+            <a:r>
+              <a:rPr lang="fr-BE" sz="1800" dirty="0">
+                <a:solidFill>
+                  <a:srgbClr val="00B050"/>
+                </a:solidFill>
+              </a:rPr>
+              <a:t>Florent - </a:t>
+            </a:r>
+            <a:r>
+              <a:rPr lang="fr-BE" sz="1800" dirty="0">
+                <a:solidFill>
+                  <a:srgbClr val="FFC000"/>
+                </a:solidFill>
+              </a:rPr>
+              <a:t>Adrien</a:t>
+            </a:r>
+          </a:p>
+          <a:p>
+            <a:r>
+              <a:rPr lang="fr-BE" sz="1800" dirty="0"/>
+              <a:t>Raspberry pi pour la modularité du drone (autre type de caméra, de capteurs,…) </a:t>
+            </a:r>
+          </a:p>
+          <a:p>
+            <a:r>
+              <a:rPr lang="fr-BE" sz="1800" dirty="0"/>
+              <a:t>Pour la structure : comment permettre à celle-ci d’être modulable? + forme et nombre de pièces. -&gt; </a:t>
+            </a:r>
+            <a:r>
+              <a:rPr lang="fr-BE" sz="1800" dirty="0">
+                <a:solidFill>
+                  <a:srgbClr val="FF0000"/>
+                </a:solidFill>
+              </a:rPr>
+              <a:t>Valentin</a:t>
+            </a:r>
+          </a:p>
+          <a:p>
+            <a:endParaRPr lang="fr-BE" sz="1800" dirty="0"/>
+          </a:p>
+          <a:p>
+            <a:endParaRPr lang="fr-BE" sz="1800" dirty="0"/>
+          </a:p>
+          <a:p>
+            <a:endParaRPr lang="fr-BE" sz="1800" dirty="0"/>
+          </a:p>
+          <a:p>
+            <a:endParaRPr lang="fr-BE" sz="1800" dirty="0"/>
+          </a:p>
+          <a:p>
+            <a:endParaRPr lang="en-GB" dirty="0"/>
+          </a:p>
+        </p:txBody>
+      </p:sp>
+    </p:spTree>
+    <p:extLst>
+      <p:ext uri="{BB962C8B-B14F-4D97-AF65-F5344CB8AC3E}">
+        <p14:creationId xmlns:p14="http://schemas.microsoft.com/office/powerpoint/2010/main" val="109899461"/>
       </p:ext>
     </p:extLst>
   </p:cSld>
@@ -8949,7 +9338,9 @@
         </p:nvSpPr>
         <p:spPr/>
         <p:txBody>
-          <a:bodyPr/>
+          <a:bodyPr>
+            <a:normAutofit lnSpcReduction="10000"/>
+          </a:bodyPr>
           <a:lstStyle/>
           <a:p>
             <a:pPr>
@@ -9128,6 +9519,49 @@
             <a:r>
               <a:rPr lang="fr-BE" dirty="0"/>
               <a:t> ?</a:t>
+            </a:r>
+          </a:p>
+          <a:p>
+            <a:pPr lvl="1">
+              <a:buClr>
+                <a:srgbClr val="FF9900"/>
+              </a:buClr>
+            </a:pPr>
+            <a:r>
+              <a:rPr lang="fr-BE" dirty="0" err="1"/>
+              <a:t>Porpeller</a:t>
+            </a:r>
+            <a:r>
+              <a:rPr lang="fr-BE" dirty="0"/>
+              <a:t> : must </a:t>
+            </a:r>
+            <a:r>
+              <a:rPr lang="fr-BE" dirty="0" err="1"/>
+              <a:t>be</a:t>
+            </a:r>
+            <a:r>
+              <a:rPr lang="fr-BE" dirty="0"/>
+              <a:t> </a:t>
+            </a:r>
+            <a:r>
+              <a:rPr lang="fr-BE" dirty="0" err="1"/>
+              <a:t>chosen</a:t>
+            </a:r>
+            <a:r>
+              <a:rPr lang="fr-BE" dirty="0"/>
+              <a:t> in </a:t>
+            </a:r>
+            <a:r>
+              <a:rPr lang="fr-BE" dirty="0" err="1"/>
+              <a:t>function</a:t>
+            </a:r>
+            <a:r>
+              <a:rPr lang="fr-BE" dirty="0"/>
+              <a:t> of the ESC and the </a:t>
+            </a:r>
+            <a:r>
+              <a:rPr lang="fr-BE" dirty="0" err="1"/>
+              <a:t>motor</a:t>
             </a:r>
             <a:endParaRPr lang="en-GB" dirty="0"/>
           </a:p>
@@ -9387,6 +9821,30 @@
               <a:rPr lang="fr-BE" dirty="0" err="1"/>
               <a:t>battery</a:t>
             </a:r>
+            <a:endParaRPr lang="fr-BE" dirty="0"/>
+          </a:p>
+          <a:p>
+            <a:pPr lvl="1">
+              <a:buClr>
+                <a:srgbClr val="FF9900"/>
+              </a:buClr>
+            </a:pPr>
+            <a:endParaRPr lang="fr-BE" dirty="0"/>
+          </a:p>
+          <a:p>
+            <a:pPr lvl="1">
+              <a:buClr>
+                <a:srgbClr val="FF9900"/>
+              </a:buClr>
+            </a:pPr>
+            <a:r>
+              <a:rPr lang="fr-BE" dirty="0"/>
+              <a:t>Power distribution </a:t>
+            </a:r>
+            <a:r>
+              <a:rPr lang="fr-BE" dirty="0" err="1"/>
+              <a:t>board</a:t>
+            </a:r>
             <a:endParaRPr lang="en-GB" dirty="0"/>
           </a:p>
           <a:p>
@@ -9447,7 +9905,7 @@
         </p:nvSpPr>
         <p:spPr>
           <a:xfrm>
-            <a:off x="1" y="0"/>
+            <a:off x="0" y="0"/>
             <a:ext cx="12192000" cy="1501629"/>
           </a:xfrm>
           <a:prstGeom prst="rect">
@@ -10194,7 +10652,7 @@
             </a:pPr>
             <a:r>
               <a:rPr lang="fr-BE" dirty="0" err="1"/>
-              <a:t>Altimeter</a:t>
+              <a:t>Barometre</a:t>
             </a:r>
             <a:r>
               <a:rPr lang="fr-BE" dirty="0"/>
@@ -10996,42 +11454,6 @@
               <a:buNone/>
             </a:pPr>
             <a:endParaRPr lang="fr-BE" dirty="0"/>
-          </a:p>
-          <a:p>
-            <a:pPr marL="457200" lvl="1" indent="0">
-              <a:buClr>
-                <a:srgbClr val="FF9900"/>
-              </a:buClr>
-              <a:buNone/>
-            </a:pPr>
-            <a:r>
-              <a:rPr lang="fr-BE" dirty="0" err="1"/>
-              <a:t>Idea</a:t>
-            </a:r>
-            <a:r>
-              <a:rPr lang="fr-BE" dirty="0"/>
-              <a:t> : </a:t>
-            </a:r>
-            <a:r>
-              <a:rPr lang="en-GB" dirty="0"/>
-              <a:t>Ventana GW5510 Rugged &amp; Industrial Single Board Computer?</a:t>
-            </a:r>
-          </a:p>
-          <a:p>
-            <a:pPr marL="457200" lvl="1" indent="0">
-              <a:buClr>
-                <a:srgbClr val="FF9900"/>
-              </a:buClr>
-              <a:buNone/>
-            </a:pPr>
-            <a:r>
-              <a:rPr lang="fr-BE" sz="1600" dirty="0">
-                <a:solidFill>
-                  <a:srgbClr val="00B0F0"/>
-                </a:solidFill>
-              </a:rPr>
-              <a:t>https://www.gateworks.com/products/industrial-single-board-computers/imx6-single-board-computer-gateworks-ventana-family/gw5510-single-board-computer/</a:t>
-            </a:r>
           </a:p>
           <a:p>
             <a:pPr lvl="1">

</xml_diff>